<commit_message>
added part of week 2
</commit_message>
<xml_diff>
--- a/extraResources/Week1.pptx
+++ b/extraResources/Week1.pptx
@@ -224,7 +224,7 @@
           <a:p>
             <a:fld id="{7C11E579-9A39-400A-B08B-F1F73EEB66DF}" type="datetimeFigureOut">
               <a:rPr lang="nl-NL" smtClean="0"/>
-              <a:t>16-12-2022</a:t>
+              <a:t>2-1-2023</a:t>
             </a:fld>
             <a:endParaRPr lang="nl-NL"/>
           </a:p>
@@ -838,7 +838,7 @@
           <a:p>
             <a:fld id="{3D636C07-7E76-46D3-B86B-6AF7C60E533E}" type="datetimeFigureOut">
               <a:rPr lang="nl-NL" smtClean="0"/>
-              <a:t>16-12-2022</a:t>
+              <a:t>2-1-2023</a:t>
             </a:fld>
             <a:endParaRPr lang="nl-NL"/>
           </a:p>
@@ -1001,7 +1001,7 @@
           <a:p>
             <a:fld id="{3D636C07-7E76-46D3-B86B-6AF7C60E533E}" type="datetimeFigureOut">
               <a:rPr lang="nl-NL" smtClean="0"/>
-              <a:t>16-12-2022</a:t>
+              <a:t>2-1-2023</a:t>
             </a:fld>
             <a:endParaRPr lang="nl-NL"/>
           </a:p>
@@ -1174,7 +1174,7 @@
           <a:p>
             <a:fld id="{3D636C07-7E76-46D3-B86B-6AF7C60E533E}" type="datetimeFigureOut">
               <a:rPr lang="nl-NL" smtClean="0"/>
-              <a:t>16-12-2022</a:t>
+              <a:t>2-1-2023</a:t>
             </a:fld>
             <a:endParaRPr lang="nl-NL"/>
           </a:p>
@@ -2782,7 +2782,7 @@
           <a:p>
             <a:fld id="{3D636C07-7E76-46D3-B86B-6AF7C60E533E}" type="datetimeFigureOut">
               <a:rPr lang="nl-NL" smtClean="0"/>
-              <a:t>16-12-2022</a:t>
+              <a:t>2-1-2023</a:t>
             </a:fld>
             <a:endParaRPr lang="nl-NL"/>
           </a:p>
@@ -5440,7 +5440,7 @@
           <a:p>
             <a:fld id="{3D636C07-7E76-46D3-B86B-6AF7C60E533E}" type="datetimeFigureOut">
               <a:rPr lang="nl-NL" smtClean="0"/>
-              <a:t>16-12-2022</a:t>
+              <a:t>2-1-2023</a:t>
             </a:fld>
             <a:endParaRPr lang="nl-NL"/>
           </a:p>
@@ -5720,7 +5720,7 @@
           <a:p>
             <a:fld id="{3D636C07-7E76-46D3-B86B-6AF7C60E533E}" type="datetimeFigureOut">
               <a:rPr lang="nl-NL" smtClean="0"/>
-              <a:t>16-12-2022</a:t>
+              <a:t>2-1-2023</a:t>
             </a:fld>
             <a:endParaRPr lang="nl-NL"/>
           </a:p>
@@ -6134,7 +6134,7 @@
           <a:p>
             <a:fld id="{3D636C07-7E76-46D3-B86B-6AF7C60E533E}" type="datetimeFigureOut">
               <a:rPr lang="nl-NL" smtClean="0"/>
-              <a:t>16-12-2022</a:t>
+              <a:t>2-1-2023</a:t>
             </a:fld>
             <a:endParaRPr lang="nl-NL"/>
           </a:p>
@@ -6246,7 +6246,7 @@
           <a:p>
             <a:fld id="{3D636C07-7E76-46D3-B86B-6AF7C60E533E}" type="datetimeFigureOut">
               <a:rPr lang="nl-NL" smtClean="0"/>
-              <a:t>16-12-2022</a:t>
+              <a:t>2-1-2023</a:t>
             </a:fld>
             <a:endParaRPr lang="nl-NL"/>
           </a:p>
@@ -6336,7 +6336,7 @@
           <a:p>
             <a:fld id="{3D636C07-7E76-46D3-B86B-6AF7C60E533E}" type="datetimeFigureOut">
               <a:rPr lang="nl-NL" smtClean="0"/>
-              <a:t>16-12-2022</a:t>
+              <a:t>2-1-2023</a:t>
             </a:fld>
             <a:endParaRPr lang="nl-NL"/>
           </a:p>
@@ -6606,7 +6606,7 @@
           <a:p>
             <a:fld id="{3D636C07-7E76-46D3-B86B-6AF7C60E533E}" type="datetimeFigureOut">
               <a:rPr lang="nl-NL" smtClean="0"/>
-              <a:t>16-12-2022</a:t>
+              <a:t>2-1-2023</a:t>
             </a:fld>
             <a:endParaRPr lang="nl-NL"/>
           </a:p>
@@ -6853,7 +6853,7 @@
           <a:p>
             <a:fld id="{3D636C07-7E76-46D3-B86B-6AF7C60E533E}" type="datetimeFigureOut">
               <a:rPr lang="nl-NL" smtClean="0"/>
-              <a:t>16-12-2022</a:t>
+              <a:t>2-1-2023</a:t>
             </a:fld>
             <a:endParaRPr lang="nl-NL"/>
           </a:p>
@@ -7059,7 +7059,7 @@
           <a:p>
             <a:fld id="{3D636C07-7E76-46D3-B86B-6AF7C60E533E}" type="datetimeFigureOut">
               <a:rPr lang="nl-NL" smtClean="0"/>
-              <a:t>16-12-2022</a:t>
+              <a:t>2-1-2023</a:t>
             </a:fld>
             <a:endParaRPr lang="nl-NL"/>
           </a:p>
@@ -9139,11 +9139,11 @@
               <a:rPr lang="nl-NL" altLang="nl-NL" sz="2200" dirty="0"/>
             </a:br>
             <a:br>
-              <a:rPr lang="nl-NL" altLang="nl-NL" sz="2200" dirty="0"/>
+              <a:rPr lang="nl-NL" altLang="nl-NL" sz="2200"/>
             </a:br>
             <a:r>
-              <a:rPr lang="nl-NL" altLang="nl-NL" sz="2200" dirty="0"/>
-              <a:t>Werken bij DUO</a:t>
+              <a:rPr lang="nl-NL" altLang="nl-NL" sz="2200"/>
+              <a:t>Workshop week 1</a:t>
             </a:r>
             <a:br>
               <a:rPr lang="nl-NL" altLang="nl-NL" sz="2200" dirty="0"/>

</xml_diff>